<commit_message>
smaller leaves in background image
</commit_message>
<xml_diff>
--- a/designs.pptx
+++ b/designs.pptx
@@ -259,7 +259,7 @@
           <a:p>
             <a:fld id="{067B53F1-DCFF-4C99-8F5A-9EE2D35ADDAE}" type="datetimeFigureOut">
               <a:rPr lang="en-US" smtClean="0"/>
-              <a:t>6/25/2024</a:t>
+              <a:t>6/26/2024</a:t>
             </a:fld>
             <a:endParaRPr lang="en-US"/>
           </a:p>
@@ -457,7 +457,7 @@
           <a:p>
             <a:fld id="{067B53F1-DCFF-4C99-8F5A-9EE2D35ADDAE}" type="datetimeFigureOut">
               <a:rPr lang="en-US" smtClean="0"/>
-              <a:t>6/25/2024</a:t>
+              <a:t>6/26/2024</a:t>
             </a:fld>
             <a:endParaRPr lang="en-US"/>
           </a:p>
@@ -665,7 +665,7 @@
           <a:p>
             <a:fld id="{067B53F1-DCFF-4C99-8F5A-9EE2D35ADDAE}" type="datetimeFigureOut">
               <a:rPr lang="en-US" smtClean="0"/>
-              <a:t>6/25/2024</a:t>
+              <a:t>6/26/2024</a:t>
             </a:fld>
             <a:endParaRPr lang="en-US"/>
           </a:p>
@@ -863,7 +863,7 @@
           <a:p>
             <a:fld id="{067B53F1-DCFF-4C99-8F5A-9EE2D35ADDAE}" type="datetimeFigureOut">
               <a:rPr lang="en-US" smtClean="0"/>
-              <a:t>6/25/2024</a:t>
+              <a:t>6/26/2024</a:t>
             </a:fld>
             <a:endParaRPr lang="en-US"/>
           </a:p>
@@ -1138,7 +1138,7 @@
           <a:p>
             <a:fld id="{067B53F1-DCFF-4C99-8F5A-9EE2D35ADDAE}" type="datetimeFigureOut">
               <a:rPr lang="en-US" smtClean="0"/>
-              <a:t>6/25/2024</a:t>
+              <a:t>6/26/2024</a:t>
             </a:fld>
             <a:endParaRPr lang="en-US"/>
           </a:p>
@@ -1403,7 +1403,7 @@
           <a:p>
             <a:fld id="{067B53F1-DCFF-4C99-8F5A-9EE2D35ADDAE}" type="datetimeFigureOut">
               <a:rPr lang="en-US" smtClean="0"/>
-              <a:t>6/25/2024</a:t>
+              <a:t>6/26/2024</a:t>
             </a:fld>
             <a:endParaRPr lang="en-US"/>
           </a:p>
@@ -1815,7 +1815,7 @@
           <a:p>
             <a:fld id="{067B53F1-DCFF-4C99-8F5A-9EE2D35ADDAE}" type="datetimeFigureOut">
               <a:rPr lang="en-US" smtClean="0"/>
-              <a:t>6/25/2024</a:t>
+              <a:t>6/26/2024</a:t>
             </a:fld>
             <a:endParaRPr lang="en-US"/>
           </a:p>
@@ -1956,7 +1956,7 @@
           <a:p>
             <a:fld id="{067B53F1-DCFF-4C99-8F5A-9EE2D35ADDAE}" type="datetimeFigureOut">
               <a:rPr lang="en-US" smtClean="0"/>
-              <a:t>6/25/2024</a:t>
+              <a:t>6/26/2024</a:t>
             </a:fld>
             <a:endParaRPr lang="en-US"/>
           </a:p>
@@ -2069,7 +2069,7 @@
           <a:p>
             <a:fld id="{067B53F1-DCFF-4C99-8F5A-9EE2D35ADDAE}" type="datetimeFigureOut">
               <a:rPr lang="en-US" smtClean="0"/>
-              <a:t>6/25/2024</a:t>
+              <a:t>6/26/2024</a:t>
             </a:fld>
             <a:endParaRPr lang="en-US"/>
           </a:p>
@@ -2380,7 +2380,7 @@
           <a:p>
             <a:fld id="{067B53F1-DCFF-4C99-8F5A-9EE2D35ADDAE}" type="datetimeFigureOut">
               <a:rPr lang="en-US" smtClean="0"/>
-              <a:t>6/25/2024</a:t>
+              <a:t>6/26/2024</a:t>
             </a:fld>
             <a:endParaRPr lang="en-US"/>
           </a:p>
@@ -2668,7 +2668,7 @@
           <a:p>
             <a:fld id="{067B53F1-DCFF-4C99-8F5A-9EE2D35ADDAE}" type="datetimeFigureOut">
               <a:rPr lang="en-US" smtClean="0"/>
-              <a:t>6/25/2024</a:t>
+              <a:t>6/26/2024</a:t>
             </a:fld>
             <a:endParaRPr lang="en-US"/>
           </a:p>
@@ -2909,7 +2909,7 @@
           <a:p>
             <a:fld id="{067B53F1-DCFF-4C99-8F5A-9EE2D35ADDAE}" type="datetimeFigureOut">
               <a:rPr lang="en-US" smtClean="0"/>
-              <a:t>6/25/2024</a:t>
+              <a:t>6/26/2024</a:t>
             </a:fld>
             <a:endParaRPr lang="en-US"/>
           </a:p>
@@ -3326,12 +3326,47 @@
           <a:chExt cx="0" cy="0"/>
         </a:xfrm>
       </p:grpSpPr>
+      <p:pic>
+        <p:nvPicPr>
+          <p:cNvPr id="8" name="Picture 7" descr="A pattern of leaves on a black background&#10;&#10;Description automatically generated">
+            <a:extLst>
+              <a:ext uri="{FF2B5EF4-FFF2-40B4-BE49-F238E27FC236}">
+                <a16:creationId xmlns:a16="http://schemas.microsoft.com/office/drawing/2014/main" id="{7EFFF492-F64F-6E77-7E2B-53678D2133C2}"/>
+              </a:ext>
+            </a:extLst>
+          </p:cNvPr>
+          <p:cNvPicPr>
+            <a:picLocks noChangeAspect="1"/>
+          </p:cNvPicPr>
+          <p:nvPr/>
+        </p:nvPicPr>
+        <p:blipFill rotWithShape="1">
+          <a:blip r:embed="rId2">
+            <a:extLst>
+              <a:ext uri="{28A0092B-C50C-407E-A947-70E740481C1C}">
+                <a14:useLocalDpi xmlns:a14="http://schemas.microsoft.com/office/drawing/2010/main" val="0"/>
+              </a:ext>
+            </a:extLst>
+          </a:blip>
+          <a:srcRect l="37893" t="11644" r="53113" b="24096"/>
+          <a:stretch/>
+        </p:blipFill>
+        <p:spPr>
+          <a:xfrm>
+            <a:off x="10668005" y="3599940"/>
+            <a:ext cx="428364" cy="3060358"/>
+          </a:xfrm>
+          <a:prstGeom prst="rect">
+            <a:avLst/>
+          </a:prstGeom>
+        </p:spPr>
+      </p:pic>
       <p:grpSp>
         <p:nvGrpSpPr>
           <p:cNvPr id="9" name="Group 8">
             <a:extLst>
               <a:ext uri="{FF2B5EF4-FFF2-40B4-BE49-F238E27FC236}">
-                <a16:creationId xmlns:a16="http://schemas.microsoft.com/office/drawing/2014/main" id="{8D1D96A5-E2E9-89DB-C297-03CB21BBE6CA}"/>
+                <a16:creationId xmlns:a16="http://schemas.microsoft.com/office/drawing/2014/main" id="{89940759-7E00-DE58-2FFC-6CECFC88CFFF}"/>
               </a:ext>
             </a:extLst>
           </p:cNvPr>
@@ -3361,7 +3396,7 @@
             <p:nvPr/>
           </p:nvPicPr>
           <p:blipFill>
-            <a:blip r:embed="rId2">
+            <a:blip r:embed="rId3">
               <a:extLst>
                 <a:ext uri="{28A0092B-C50C-407E-A947-70E740481C1C}">
                   <a14:useLocalDpi xmlns:a14="http://schemas.microsoft.com/office/drawing/2010/main" val="0"/>
@@ -3397,7 +3432,7 @@
             <p:nvPr/>
           </p:nvPicPr>
           <p:blipFill rotWithShape="1">
-            <a:blip r:embed="rId3">
+            <a:blip r:embed="rId2">
               <a:extLst>
                 <a:ext uri="{28A0092B-C50C-407E-A947-70E740481C1C}">
                   <a14:useLocalDpi xmlns:a14="http://schemas.microsoft.com/office/drawing/2010/main" val="0"/>
@@ -3409,8 +3444,8 @@
           </p:blipFill>
           <p:spPr>
             <a:xfrm>
-              <a:off x="9012199" y="82380"/>
-              <a:ext cx="428364" cy="3583461"/>
+              <a:off x="9221950" y="49717"/>
+              <a:ext cx="218613" cy="1828800"/>
             </a:xfrm>
             <a:prstGeom prst="rect">
               <a:avLst/>
@@ -3419,10 +3454,10 @@
         </p:pic>
         <p:pic>
           <p:nvPicPr>
-            <p:cNvPr id="8" name="Picture 7" descr="A pattern of leaves on a black background&#10;&#10;Description automatically generated">
+            <p:cNvPr id="3" name="Picture 2" descr="A pattern of leaves on a black background&#10;&#10;Description automatically generated">
               <a:extLst>
                 <a:ext uri="{FF2B5EF4-FFF2-40B4-BE49-F238E27FC236}">
-                  <a16:creationId xmlns:a16="http://schemas.microsoft.com/office/drawing/2014/main" id="{7EFFF492-F64F-6E77-7E2B-53678D2133C2}"/>
+                  <a16:creationId xmlns:a16="http://schemas.microsoft.com/office/drawing/2014/main" id="{FD76B39E-7197-B4DD-5A73-F1D1C75AFEFC}"/>
                 </a:ext>
               </a:extLst>
             </p:cNvPr>
@@ -3432,20 +3467,90 @@
             <p:nvPr/>
           </p:nvPicPr>
           <p:blipFill rotWithShape="1">
-            <a:blip r:embed="rId3">
+            <a:blip r:embed="rId2">
               <a:extLst>
                 <a:ext uri="{28A0092B-C50C-407E-A947-70E740481C1C}">
                   <a14:useLocalDpi xmlns:a14="http://schemas.microsoft.com/office/drawing/2010/main" val="0"/>
                 </a:ext>
               </a:extLst>
             </a:blip>
-            <a:srcRect l="37893" t="11644" r="53113" b="24096"/>
+            <a:srcRect l="37893" t="-205" r="53113" b="24961"/>
             <a:stretch/>
           </p:blipFill>
           <p:spPr>
             <a:xfrm>
-              <a:off x="9012199" y="3723507"/>
-              <a:ext cx="428364" cy="3060358"/>
+              <a:off x="9221950" y="1891966"/>
+              <a:ext cx="218613" cy="1828800"/>
+            </a:xfrm>
+            <a:prstGeom prst="rect">
+              <a:avLst/>
+            </a:prstGeom>
+          </p:spPr>
+        </p:pic>
+        <p:pic>
+          <p:nvPicPr>
+            <p:cNvPr id="4" name="Picture 3" descr="A pattern of leaves on a black background&#10;&#10;Description automatically generated">
+              <a:extLst>
+                <a:ext uri="{FF2B5EF4-FFF2-40B4-BE49-F238E27FC236}">
+                  <a16:creationId xmlns:a16="http://schemas.microsoft.com/office/drawing/2014/main" id="{0013D782-38A6-8DEE-3B33-2BE579C98778}"/>
+                </a:ext>
+              </a:extLst>
+            </p:cNvPr>
+            <p:cNvPicPr>
+              <a:picLocks noChangeAspect="1"/>
+            </p:cNvPicPr>
+            <p:nvPr/>
+          </p:nvPicPr>
+          <p:blipFill rotWithShape="1">
+            <a:blip r:embed="rId2">
+              <a:extLst>
+                <a:ext uri="{28A0092B-C50C-407E-A947-70E740481C1C}">
+                  <a14:useLocalDpi xmlns:a14="http://schemas.microsoft.com/office/drawing/2010/main" val="0"/>
+                </a:ext>
+              </a:extLst>
+            </a:blip>
+            <a:srcRect l="37893" t="-205" r="53113" b="24961"/>
+            <a:stretch/>
+          </p:blipFill>
+          <p:spPr>
+            <a:xfrm>
+              <a:off x="9221950" y="3734215"/>
+              <a:ext cx="218613" cy="1828800"/>
+            </a:xfrm>
+            <a:prstGeom prst="rect">
+              <a:avLst/>
+            </a:prstGeom>
+          </p:spPr>
+        </p:pic>
+        <p:pic>
+          <p:nvPicPr>
+            <p:cNvPr id="2" name="Picture 1" descr="A pattern of leaves on a black background&#10;&#10;Description automatically generated">
+              <a:extLst>
+                <a:ext uri="{FF2B5EF4-FFF2-40B4-BE49-F238E27FC236}">
+                  <a16:creationId xmlns:a16="http://schemas.microsoft.com/office/drawing/2014/main" id="{D644089B-B7F4-DF08-5D73-F17A30F57B3D}"/>
+                </a:ext>
+              </a:extLst>
+            </p:cNvPr>
+            <p:cNvPicPr>
+              <a:picLocks noChangeAspect="1"/>
+            </p:cNvPicPr>
+            <p:nvPr/>
+          </p:nvPicPr>
+          <p:blipFill rotWithShape="1">
+            <a:blip r:embed="rId2">
+              <a:extLst>
+                <a:ext uri="{28A0092B-C50C-407E-A947-70E740481C1C}">
+                  <a14:useLocalDpi xmlns:a14="http://schemas.microsoft.com/office/drawing/2010/main" val="0"/>
+                </a:ext>
+              </a:extLst>
+            </a:blip>
+            <a:srcRect l="37893" t="24413" r="53113" b="24096"/>
+            <a:stretch/>
+          </p:blipFill>
+          <p:spPr>
+            <a:xfrm>
+              <a:off x="9221107" y="5576464"/>
+              <a:ext cx="219456" cy="1256311"/>
             </a:xfrm>
             <a:prstGeom prst="rect">
               <a:avLst/>

</xml_diff>